<commit_message>
added related works page
</commit_message>
<xml_diff>
--- a/Presentation.pptx
+++ b/Presentation.pptx
@@ -204,7 +204,7 @@
           <a:p>
             <a:fld id="{A92FD88C-0FAE-C44E-AAEB-B2152DD4B707}" type="datetimeFigureOut">
               <a:rPr lang="en-US" smtClean="0"/>
-              <a:t>12/4/12</a:t>
+              <a:t>12/4/2012</a:t>
             </a:fld>
             <a:endParaRPr lang="en-US"/>
           </a:p>
@@ -927,7 +927,7 @@
           <a:p>
             <a:fld id="{138244CB-0D3F-1843-BA46-E3D6C5C4EAA0}" type="datetimeFigureOut">
               <a:rPr lang="en-US" smtClean="0"/>
-              <a:t>12/4/12</a:t>
+              <a:t>12/4/2012</a:t>
             </a:fld>
             <a:endParaRPr lang="en-US"/>
           </a:p>
@@ -1097,7 +1097,7 @@
           <a:p>
             <a:fld id="{138244CB-0D3F-1843-BA46-E3D6C5C4EAA0}" type="datetimeFigureOut">
               <a:rPr lang="en-US" smtClean="0"/>
-              <a:t>12/4/12</a:t>
+              <a:t>12/4/2012</a:t>
             </a:fld>
             <a:endParaRPr lang="en-US"/>
           </a:p>
@@ -1277,7 +1277,7 @@
           <a:p>
             <a:fld id="{138244CB-0D3F-1843-BA46-E3D6C5C4EAA0}" type="datetimeFigureOut">
               <a:rPr lang="en-US" smtClean="0"/>
-              <a:t>12/4/12</a:t>
+              <a:t>12/4/2012</a:t>
             </a:fld>
             <a:endParaRPr lang="en-US"/>
           </a:p>
@@ -1447,7 +1447,7 @@
           <a:p>
             <a:fld id="{138244CB-0D3F-1843-BA46-E3D6C5C4EAA0}" type="datetimeFigureOut">
               <a:rPr lang="en-US" smtClean="0"/>
-              <a:t>12/4/12</a:t>
+              <a:t>12/4/2012</a:t>
             </a:fld>
             <a:endParaRPr lang="en-US"/>
           </a:p>
@@ -1693,7 +1693,7 @@
           <a:p>
             <a:fld id="{138244CB-0D3F-1843-BA46-E3D6C5C4EAA0}" type="datetimeFigureOut">
               <a:rPr lang="en-US" smtClean="0"/>
-              <a:t>12/4/12</a:t>
+              <a:t>12/4/2012</a:t>
             </a:fld>
             <a:endParaRPr lang="en-US"/>
           </a:p>
@@ -1981,7 +1981,7 @@
           <a:p>
             <a:fld id="{138244CB-0D3F-1843-BA46-E3D6C5C4EAA0}" type="datetimeFigureOut">
               <a:rPr lang="en-US" smtClean="0"/>
-              <a:t>12/4/12</a:t>
+              <a:t>12/4/2012</a:t>
             </a:fld>
             <a:endParaRPr lang="en-US"/>
           </a:p>
@@ -2407,7 +2407,7 @@
           <a:p>
             <a:fld id="{138244CB-0D3F-1843-BA46-E3D6C5C4EAA0}" type="datetimeFigureOut">
               <a:rPr lang="en-US" smtClean="0"/>
-              <a:t>12/4/12</a:t>
+              <a:t>12/4/2012</a:t>
             </a:fld>
             <a:endParaRPr lang="en-US"/>
           </a:p>
@@ -2525,7 +2525,7 @@
           <a:p>
             <a:fld id="{138244CB-0D3F-1843-BA46-E3D6C5C4EAA0}" type="datetimeFigureOut">
               <a:rPr lang="en-US" smtClean="0"/>
-              <a:t>12/4/12</a:t>
+              <a:t>12/4/2012</a:t>
             </a:fld>
             <a:endParaRPr lang="en-US"/>
           </a:p>
@@ -2620,7 +2620,7 @@
           <a:p>
             <a:fld id="{138244CB-0D3F-1843-BA46-E3D6C5C4EAA0}" type="datetimeFigureOut">
               <a:rPr lang="en-US" smtClean="0"/>
-              <a:t>12/4/12</a:t>
+              <a:t>12/4/2012</a:t>
             </a:fld>
             <a:endParaRPr lang="en-US"/>
           </a:p>
@@ -2897,7 +2897,7 @@
           <a:p>
             <a:fld id="{138244CB-0D3F-1843-BA46-E3D6C5C4EAA0}" type="datetimeFigureOut">
               <a:rPr lang="en-US" smtClean="0"/>
-              <a:t>12/4/12</a:t>
+              <a:t>12/4/2012</a:t>
             </a:fld>
             <a:endParaRPr lang="en-US"/>
           </a:p>
@@ -3150,7 +3150,7 @@
           <a:p>
             <a:fld id="{138244CB-0D3F-1843-BA46-E3D6C5C4EAA0}" type="datetimeFigureOut">
               <a:rPr lang="en-US" smtClean="0"/>
-              <a:t>12/4/12</a:t>
+              <a:t>12/4/2012</a:t>
             </a:fld>
             <a:endParaRPr lang="en-US"/>
           </a:p>
@@ -3370,7 +3370,7 @@
           <a:p>
             <a:fld id="{138244CB-0D3F-1843-BA46-E3D6C5C4EAA0}" type="datetimeFigureOut">
               <a:rPr lang="en-US" smtClean="0"/>
-              <a:t>12/4/12</a:t>
+              <a:t>12/4/2012</a:t>
             </a:fld>
             <a:endParaRPr lang="en-US"/>
           </a:p>
@@ -3787,11 +3787,7 @@
           <a:p>
             <a:r>
               <a:rPr lang="en-US" dirty="0" smtClean="0"/>
-              <a:t>Robert </a:t>
-            </a:r>
-            <a:r>
-              <a:rPr lang="en-US" dirty="0" smtClean="0"/>
-              <a:t>Christensen, Phil Lundrigan, Mark </a:t>
+              <a:t>Robert Christensen, Phil Lundrigan, Mark </a:t>
             </a:r>
             <a:r>
               <a:rPr lang="en-US" dirty="0" err="1" smtClean="0"/>
@@ -4686,6 +4682,41 @@
           <a:bodyPr/>
           <a:lstStyle/>
           <a:p>
+            <a:r>
+              <a:rPr lang="en-US" dirty="0" smtClean="0"/>
+              <a:t>Usually involve redirects with location changed to homograph-similar sites</a:t>
+            </a:r>
+          </a:p>
+          <a:p>
+            <a:pPr lvl="1"/>
+            <a:r>
+              <a:rPr lang="en-US" dirty="0" smtClean="0"/>
+              <a:t>Tools like </a:t>
+            </a:r>
+            <a:r>
+              <a:rPr lang="en-US" dirty="0" err="1" smtClean="0"/>
+              <a:t>sslstrip</a:t>
+            </a:r>
+            <a:r>
+              <a:rPr lang="en-US" dirty="0" smtClean="0"/>
+              <a:t> </a:t>
+            </a:r>
+            <a:r>
+              <a:rPr lang="en-US" smtClean="0"/>
+              <a:t>demonstrate this</a:t>
+            </a:r>
+          </a:p>
+          <a:p>
+            <a:pPr marL="457200" lvl="1" indent="0">
+              <a:buNone/>
+            </a:pPr>
+            <a:endParaRPr lang="en-US" dirty="0" smtClean="0"/>
+          </a:p>
+          <a:p>
+            <a:r>
+              <a:rPr lang="en-US" dirty="0" smtClean="0"/>
+              <a:t>Controversy about if redirects are bad practice</a:t>
+            </a:r>
             <a:endParaRPr lang="en-US" dirty="0"/>
           </a:p>
         </p:txBody>

</xml_diff>